<commit_message>
update some figures for notational consistency in MLP part
</commit_message>
<xml_diff>
--- a/slides/mlps/templates/step1.pptx
+++ b/slides/mlps/templates/step1.pptx
@@ -107,6 +107,11 @@
       </a:defRPr>
     </a:lvl9pPr>
   </p:defaultTextStyle>
+  <p:extLst>
+    <p:ext uri="{EFAFB233-063F-42B5-8137-9DF3F51BA10A}">
+      <p15:sldGuideLst xmlns:p15="http://schemas.microsoft.com/office/powerpoint/2012/main"/>
+    </p:ext>
+  </p:extLst>
 </p:presentation>
 </file>
 
@@ -192,7 +197,7 @@
           <a:p>
             <a:fld id="{1F3BC1B1-F39C-7F4A-B385-B9CB58FAE86D}" type="datetimeFigureOut">
               <a:rPr lang="en-DE" smtClean="0"/>
-              <a:t>17.01.21</a:t>
+              <a:t>14/10/2021</a:t>
             </a:fld>
             <a:endParaRPr lang="en-DE"/>
           </a:p>
@@ -722,7 +727,7 @@
           <a:p>
             <a:fld id="{8BA1CEA8-4508-984C-8923-F7676DF9183D}" type="datetimeFigureOut">
               <a:rPr lang="en-DE" smtClean="0"/>
-              <a:t>17.01.21</a:t>
+              <a:t>14/10/2021</a:t>
             </a:fld>
             <a:endParaRPr lang="en-DE"/>
           </a:p>
@@ -922,7 +927,7 @@
           <a:p>
             <a:fld id="{8BA1CEA8-4508-984C-8923-F7676DF9183D}" type="datetimeFigureOut">
               <a:rPr lang="en-DE" smtClean="0"/>
-              <a:t>17.01.21</a:t>
+              <a:t>14/10/2021</a:t>
             </a:fld>
             <a:endParaRPr lang="en-DE"/>
           </a:p>
@@ -1132,7 +1137,7 @@
           <a:p>
             <a:fld id="{8BA1CEA8-4508-984C-8923-F7676DF9183D}" type="datetimeFigureOut">
               <a:rPr lang="en-DE" smtClean="0"/>
-              <a:t>17.01.21</a:t>
+              <a:t>14/10/2021</a:t>
             </a:fld>
             <a:endParaRPr lang="en-DE"/>
           </a:p>
@@ -1691,7 +1696,7 @@
           <a:p>
             <a:fld id="{8BA1CEA8-4508-984C-8923-F7676DF9183D}" type="datetimeFigureOut">
               <a:rPr lang="en-DE" smtClean="0"/>
-              <a:t>17.01.21</a:t>
+              <a:t>14/10/2021</a:t>
             </a:fld>
             <a:endParaRPr lang="en-DE"/>
           </a:p>
@@ -1967,7 +1972,7 @@
           <a:p>
             <a:fld id="{8BA1CEA8-4508-984C-8923-F7676DF9183D}" type="datetimeFigureOut">
               <a:rPr lang="en-DE" smtClean="0"/>
-              <a:t>17.01.21</a:t>
+              <a:t>14/10/2021</a:t>
             </a:fld>
             <a:endParaRPr lang="en-DE"/>
           </a:p>
@@ -2235,7 +2240,7 @@
           <a:p>
             <a:fld id="{8BA1CEA8-4508-984C-8923-F7676DF9183D}" type="datetimeFigureOut">
               <a:rPr lang="en-DE" smtClean="0"/>
-              <a:t>17.01.21</a:t>
+              <a:t>14/10/2021</a:t>
             </a:fld>
             <a:endParaRPr lang="en-DE"/>
           </a:p>
@@ -2650,7 +2655,7 @@
           <a:p>
             <a:fld id="{8BA1CEA8-4508-984C-8923-F7676DF9183D}" type="datetimeFigureOut">
               <a:rPr lang="en-DE" smtClean="0"/>
-              <a:t>17.01.21</a:t>
+              <a:t>14/10/2021</a:t>
             </a:fld>
             <a:endParaRPr lang="en-DE"/>
           </a:p>
@@ -2792,7 +2797,7 @@
           <a:p>
             <a:fld id="{8BA1CEA8-4508-984C-8923-F7676DF9183D}" type="datetimeFigureOut">
               <a:rPr lang="en-DE" smtClean="0"/>
-              <a:t>17.01.21</a:t>
+              <a:t>14/10/2021</a:t>
             </a:fld>
             <a:endParaRPr lang="en-DE"/>
           </a:p>
@@ -2905,7 +2910,7 @@
           <a:p>
             <a:fld id="{8BA1CEA8-4508-984C-8923-F7676DF9183D}" type="datetimeFigureOut">
               <a:rPr lang="en-DE" smtClean="0"/>
-              <a:t>17.01.21</a:t>
+              <a:t>14/10/2021</a:t>
             </a:fld>
             <a:endParaRPr lang="en-DE"/>
           </a:p>
@@ -3218,7 +3223,7 @@
           <a:p>
             <a:fld id="{8BA1CEA8-4508-984C-8923-F7676DF9183D}" type="datetimeFigureOut">
               <a:rPr lang="en-DE" smtClean="0"/>
-              <a:t>17.01.21</a:t>
+              <a:t>14/10/2021</a:t>
             </a:fld>
             <a:endParaRPr lang="en-DE"/>
           </a:p>
@@ -3507,7 +3512,7 @@
           <a:p>
             <a:fld id="{8BA1CEA8-4508-984C-8923-F7676DF9183D}" type="datetimeFigureOut">
               <a:rPr lang="en-DE" smtClean="0"/>
-              <a:t>17.01.21</a:t>
+              <a:t>14/10/2021</a:t>
             </a:fld>
             <a:endParaRPr lang="en-DE"/>
           </a:p>
@@ -3750,7 +3755,7 @@
           <a:p>
             <a:fld id="{8BA1CEA8-4508-984C-8923-F7676DF9183D}" type="datetimeFigureOut">
               <a:rPr lang="en-DE" smtClean="0"/>
-              <a:t>17.01.21</a:t>
+              <a:t>14/10/2021</a:t>
             </a:fld>
             <a:endParaRPr lang="en-DE"/>
           </a:p>
@@ -4182,10 +4187,10 @@
         </p:nvGrpSpPr>
         <p:grpSpPr>
           <a:xfrm>
-            <a:off x="3352334" y="2136200"/>
-            <a:ext cx="5487332" cy="2585600"/>
+            <a:off x="3352334" y="2118444"/>
+            <a:ext cx="4122034" cy="2585600"/>
             <a:chOff x="2514250" y="1602150"/>
-            <a:chExt cx="4115499" cy="1939200"/>
+            <a:chExt cx="3091525" cy="1939200"/>
           </a:xfrm>
         </p:grpSpPr>
         <p:grpSp>
@@ -4203,9 +4208,9 @@
           <p:grpSpPr>
             <a:xfrm>
               <a:off x="2514250" y="1602150"/>
-              <a:ext cx="4115499" cy="1939200"/>
+              <a:ext cx="3091525" cy="1939200"/>
               <a:chOff x="1299525" y="1687775"/>
-              <a:chExt cx="4115499" cy="1939200"/>
+              <a:chExt cx="3091525" cy="1939200"/>
             </a:xfrm>
           </p:grpSpPr>
           <p:sp>
@@ -4422,34 +4427,6 @@
               </a:ln>
             </p:spPr>
           </p:cxnSp>
-          <p:pic>
-            <p:nvPicPr>
-              <p:cNvPr id="186" name="Google Shape;186;p17" descr="z = w_1x_1 + w_2x_2 + w_3x_3 + b" title="MathEquation,#000000"/>
-              <p:cNvPicPr preferRelativeResize="0"/>
-              <p:nvPr/>
-            </p:nvPicPr>
-            <p:blipFill>
-              <a:blip r:embed="rId3">
-                <a:alphaModFix/>
-              </a:blip>
-              <a:stretch>
-                <a:fillRect/>
-              </a:stretch>
-            </p:blipFill>
-            <p:spPr>
-              <a:xfrm>
-                <a:off x="2399850" y="3382000"/>
-                <a:ext cx="3015174" cy="244975"/>
-              </a:xfrm>
-              <a:prstGeom prst="rect">
-                <a:avLst/>
-              </a:prstGeom>
-              <a:noFill/>
-              <a:ln>
-                <a:noFill/>
-              </a:ln>
-            </p:spPr>
-          </p:pic>
           <p:sp>
             <p:nvSpPr>
               <p:cNvPr id="183" name="Google Shape;183;p17"/>
@@ -4497,7 +4474,7 @@
               <p:nvPr/>
             </p:nvPicPr>
             <p:blipFill>
-              <a:blip r:embed="rId4">
+              <a:blip r:embed="rId3">
                 <a:alphaModFix/>
               </a:blip>
               <a:stretch>
@@ -4525,7 +4502,7 @@
               <p:nvPr/>
             </p:nvPicPr>
             <p:blipFill>
-              <a:blip r:embed="rId5">
+              <a:blip r:embed="rId4">
                 <a:alphaModFix/>
               </a:blip>
               <a:stretch>
@@ -4553,7 +4530,7 @@
               <p:nvPr/>
             </p:nvPicPr>
             <p:blipFill>
-              <a:blip r:embed="rId6">
+              <a:blip r:embed="rId5">
                 <a:alphaModFix/>
               </a:blip>
               <a:stretch>
@@ -4581,7 +4558,7 @@
               <p:nvPr/>
             </p:nvPicPr>
             <p:blipFill>
-              <a:blip r:embed="rId7">
+              <a:blip r:embed="rId6">
                 <a:alphaModFix/>
               </a:blip>
               <a:stretch>
@@ -4609,7 +4586,7 @@
               <p:nvPr/>
             </p:nvPicPr>
             <p:blipFill>
-              <a:blip r:embed="rId8">
+              <a:blip r:embed="rId7">
                 <a:alphaModFix/>
               </a:blip>
               <a:stretch>
@@ -4637,7 +4614,7 @@
               <p:nvPr/>
             </p:nvPicPr>
             <p:blipFill>
-              <a:blip r:embed="rId9">
+              <a:blip r:embed="rId8">
                 <a:alphaModFix/>
               </a:blip>
               <a:stretch>
@@ -4675,8 +4652,8 @@
               </p:nvSpPr>
               <p:spPr>
                 <a:xfrm>
-                  <a:off x="5028155" y="2387085"/>
-                  <a:ext cx="294640" cy="346249"/>
+                  <a:off x="4981545" y="2387086"/>
+                  <a:ext cx="294640" cy="323165"/>
                 </a:xfrm>
                 <a:prstGeom prst="rect">
                   <a:avLst/>
@@ -4696,17 +4673,38 @@
                         <m:jc m:val="centerGroup"/>
                       </m:oMathParaPr>
                       <m:oMath xmlns:m="http://schemas.openxmlformats.org/officeDocument/2006/math">
-                        <m:r>
-                          <a:rPr lang="de-DE" sz="2400" i="1">
-                            <a:latin typeface="Cambria Math" panose="02040503050406030204" pitchFamily="18" charset="0"/>
-                            <a:cs typeface="Mangal" panose="02040503050203030202" pitchFamily="18" charset="0"/>
-                          </a:rPr>
-                          <m:t>𝑧</m:t>
-                        </m:r>
+                        <m:sSub>
+                          <m:sSubPr>
+                            <m:ctrlPr>
+                              <a:rPr lang="en-GB" sz="2200" b="0" i="1" smtClean="0">
+                                <a:latin typeface="Cambria Math" panose="02040503050406030204" pitchFamily="18" charset="0"/>
+                                <a:cs typeface="Mangal" panose="02040503050203030202" pitchFamily="18" charset="0"/>
+                              </a:rPr>
+                            </m:ctrlPr>
+                          </m:sSubPr>
+                          <m:e>
+                            <m:r>
+                              <a:rPr lang="de-DE" sz="2200" i="1" smtClean="0">
+                                <a:latin typeface="Cambria Math" panose="02040503050406030204" pitchFamily="18" charset="0"/>
+                                <a:cs typeface="Mangal" panose="02040503050203030202" pitchFamily="18" charset="0"/>
+                              </a:rPr>
+                              <m:t>𝑧</m:t>
+                            </m:r>
+                          </m:e>
+                          <m:sub>
+                            <m:r>
+                              <a:rPr lang="en-GB" sz="2200" b="0" i="1" smtClean="0">
+                                <a:latin typeface="Cambria Math" panose="02040503050406030204" pitchFamily="18" charset="0"/>
+                                <a:cs typeface="Mangal" panose="02040503050203030202" pitchFamily="18" charset="0"/>
+                              </a:rPr>
+                              <m:t>𝑖𝑛</m:t>
+                            </m:r>
+                          </m:sub>
+                        </m:sSub>
                       </m:oMath>
                     </m:oMathPara>
                   </a14:m>
-                  <a:endParaRPr lang="en-DE" sz="2400" i="1" dirty="0">
+                  <a:endParaRPr lang="en-DE" sz="2200" i="1" dirty="0">
                     <a:latin typeface="Mangal" panose="02040503050203030202" pitchFamily="18" charset="0"/>
                     <a:cs typeface="Mangal" panose="02040503050203030202" pitchFamily="18" charset="0"/>
                   </a:endParaRPr>
@@ -4731,16 +4729,16 @@
               </p:nvSpPr>
               <p:spPr>
                 <a:xfrm>
-                  <a:off x="5028155" y="2387085"/>
-                  <a:ext cx="294640" cy="346249"/>
+                  <a:off x="4981545" y="2387086"/>
+                  <a:ext cx="294640" cy="323165"/>
                 </a:xfrm>
                 <a:prstGeom prst="rect">
                   <a:avLst/>
                 </a:prstGeom>
                 <a:blipFill>
-                  <a:blip r:embed="rId10"/>
+                  <a:blip r:embed="rId9"/>
                   <a:stretch>
-                    <a:fillRect/>
+                    <a:fillRect r="-28125"/>
                   </a:stretch>
                 </a:blipFill>
               </p:spPr>
@@ -4760,6 +4758,300 @@
           </mc:Fallback>
         </mc:AlternateContent>
       </p:grpSp>
+      <mc:AlternateContent xmlns:mc="http://schemas.openxmlformats.org/markup-compatibility/2006">
+        <mc:Choice xmlns:a14="http://schemas.microsoft.com/office/drawing/2010/main" Requires="a14">
+          <p:sp>
+            <p:nvSpPr>
+              <p:cNvPr id="6" name="TextBox 5">
+                <a:extLst>
+                  <a:ext uri="{FF2B5EF4-FFF2-40B4-BE49-F238E27FC236}">
+                    <a16:creationId xmlns:a16="http://schemas.microsoft.com/office/drawing/2014/main" id="{7E0C18B7-DAE0-4845-A669-40709E44FD0C}"/>
+                  </a:ext>
+                </a:extLst>
+              </p:cNvPr>
+              <p:cNvSpPr txBox="1"/>
+              <p:nvPr/>
+            </p:nvSpPr>
+            <p:spPr>
+              <a:xfrm>
+                <a:off x="5205832" y="4198605"/>
+                <a:ext cx="3755323" cy="338554"/>
+              </a:xfrm>
+              <a:prstGeom prst="rect">
+                <a:avLst/>
+              </a:prstGeom>
+              <a:noFill/>
+            </p:spPr>
+            <p:txBody>
+              <a:bodyPr wrap="none" lIns="0" tIns="0" rIns="0" bIns="0" rtlCol="0">
+                <a:spAutoFit/>
+              </a:bodyPr>
+              <a:lstStyle/>
+              <a:p>
+                <a14:m>
+                  <m:oMathPara xmlns:m="http://schemas.openxmlformats.org/officeDocument/2006/math">
+                    <m:oMathParaPr>
+                      <m:jc m:val="centerGroup"/>
+                    </m:oMathParaPr>
+                    <m:oMath xmlns:m="http://schemas.openxmlformats.org/officeDocument/2006/math">
+                      <m:sSub>
+                        <m:sSubPr>
+                          <m:ctrlPr>
+                            <a:rPr lang="en-GB" sz="2200" b="0" i="1" smtClean="0">
+                              <a:latin typeface="Cambria Math" panose="02040503050406030204" pitchFamily="18" charset="0"/>
+                            </a:rPr>
+                          </m:ctrlPr>
+                        </m:sSubPr>
+                        <m:e>
+                          <m:r>
+                            <a:rPr lang="en-GB" sz="2200" b="0" i="1" smtClean="0">
+                              <a:latin typeface="Cambria Math" panose="02040503050406030204" pitchFamily="18" charset="0"/>
+                            </a:rPr>
+                            <m:t>𝑧</m:t>
+                          </m:r>
+                        </m:e>
+                        <m:sub>
+                          <m:r>
+                            <a:rPr lang="en-GB" sz="2200" b="0" i="1" smtClean="0">
+                              <a:latin typeface="Cambria Math" panose="02040503050406030204" pitchFamily="18" charset="0"/>
+                            </a:rPr>
+                            <m:t>𝑖𝑛</m:t>
+                          </m:r>
+                        </m:sub>
+                      </m:sSub>
+                      <m:r>
+                        <a:rPr lang="en-GB" sz="2200" b="0" i="1" smtClean="0">
+                          <a:latin typeface="Cambria Math" panose="02040503050406030204" pitchFamily="18" charset="0"/>
+                        </a:rPr>
+                        <m:t>=</m:t>
+                      </m:r>
+                      <m:sSub>
+                        <m:sSubPr>
+                          <m:ctrlPr>
+                            <a:rPr lang="en-GB" sz="2200" b="0" i="1" smtClean="0">
+                              <a:latin typeface="Cambria Math" panose="02040503050406030204" pitchFamily="18" charset="0"/>
+                            </a:rPr>
+                          </m:ctrlPr>
+                        </m:sSubPr>
+                        <m:e>
+                          <m:r>
+                            <a:rPr lang="en-GB" sz="2200" b="0" i="1" smtClean="0">
+                              <a:latin typeface="Cambria Math" panose="02040503050406030204" pitchFamily="18" charset="0"/>
+                            </a:rPr>
+                            <m:t>𝑤</m:t>
+                          </m:r>
+                        </m:e>
+                        <m:sub>
+                          <m:r>
+                            <a:rPr lang="en-GB" sz="2200" b="0" i="1" smtClean="0">
+                              <a:latin typeface="Cambria Math" panose="02040503050406030204" pitchFamily="18" charset="0"/>
+                            </a:rPr>
+                            <m:t>1</m:t>
+                          </m:r>
+                        </m:sub>
+                      </m:sSub>
+                      <m:sSub>
+                        <m:sSubPr>
+                          <m:ctrlPr>
+                            <a:rPr lang="en-GB" sz="2200" b="0" i="1" smtClean="0">
+                              <a:latin typeface="Cambria Math" panose="02040503050406030204" pitchFamily="18" charset="0"/>
+                            </a:rPr>
+                          </m:ctrlPr>
+                        </m:sSubPr>
+                        <m:e>
+                          <m:r>
+                            <a:rPr lang="en-GB" sz="2200" b="0" i="1" smtClean="0">
+                              <a:latin typeface="Cambria Math" panose="02040503050406030204" pitchFamily="18" charset="0"/>
+                            </a:rPr>
+                            <m:t>𝑥</m:t>
+                          </m:r>
+                        </m:e>
+                        <m:sub>
+                          <m:r>
+                            <a:rPr lang="en-GB" sz="2200" b="0" i="1" smtClean="0">
+                              <a:latin typeface="Cambria Math" panose="02040503050406030204" pitchFamily="18" charset="0"/>
+                            </a:rPr>
+                            <m:t>1</m:t>
+                          </m:r>
+                        </m:sub>
+                      </m:sSub>
+                      <m:r>
+                        <a:rPr lang="en-GB" sz="2200" b="0" i="1" smtClean="0">
+                          <a:latin typeface="Cambria Math" panose="02040503050406030204" pitchFamily="18" charset="0"/>
+                        </a:rPr>
+                        <m:t>+</m:t>
+                      </m:r>
+                      <m:sSub>
+                        <m:sSubPr>
+                          <m:ctrlPr>
+                            <a:rPr lang="en-GB" sz="2200" b="0" i="1" smtClean="0">
+                              <a:latin typeface="Cambria Math" panose="02040503050406030204" pitchFamily="18" charset="0"/>
+                            </a:rPr>
+                          </m:ctrlPr>
+                        </m:sSubPr>
+                        <m:e>
+                          <m:r>
+                            <a:rPr lang="en-GB" sz="2200" b="0" i="1" smtClean="0">
+                              <a:latin typeface="Cambria Math" panose="02040503050406030204" pitchFamily="18" charset="0"/>
+                            </a:rPr>
+                            <m:t>𝑤</m:t>
+                          </m:r>
+                        </m:e>
+                        <m:sub>
+                          <m:r>
+                            <a:rPr lang="en-GB" sz="2200" b="0" i="1" smtClean="0">
+                              <a:latin typeface="Cambria Math" panose="02040503050406030204" pitchFamily="18" charset="0"/>
+                            </a:rPr>
+                            <m:t>2</m:t>
+                          </m:r>
+                        </m:sub>
+                      </m:sSub>
+                      <m:sSub>
+                        <m:sSubPr>
+                          <m:ctrlPr>
+                            <a:rPr lang="en-GB" sz="2200" b="0" i="1" smtClean="0">
+                              <a:latin typeface="Cambria Math" panose="02040503050406030204" pitchFamily="18" charset="0"/>
+                            </a:rPr>
+                          </m:ctrlPr>
+                        </m:sSubPr>
+                        <m:e>
+                          <m:r>
+                            <a:rPr lang="en-GB" sz="2200" b="0" i="1" smtClean="0">
+                              <a:latin typeface="Cambria Math" panose="02040503050406030204" pitchFamily="18" charset="0"/>
+                            </a:rPr>
+                            <m:t>𝑥</m:t>
+                          </m:r>
+                        </m:e>
+                        <m:sub>
+                          <m:r>
+                            <a:rPr lang="en-GB" sz="2200" b="0" i="1" smtClean="0">
+                              <a:latin typeface="Cambria Math" panose="02040503050406030204" pitchFamily="18" charset="0"/>
+                            </a:rPr>
+                            <m:t>2</m:t>
+                          </m:r>
+                        </m:sub>
+                      </m:sSub>
+                      <m:r>
+                        <a:rPr lang="en-GB" sz="2200" b="0" i="1" smtClean="0">
+                          <a:latin typeface="Cambria Math" panose="02040503050406030204" pitchFamily="18" charset="0"/>
+                        </a:rPr>
+                        <m:t>+</m:t>
+                      </m:r>
+                      <m:sSub>
+                        <m:sSubPr>
+                          <m:ctrlPr>
+                            <a:rPr lang="en-GB" sz="2200" b="0" i="1" smtClean="0">
+                              <a:latin typeface="Cambria Math" panose="02040503050406030204" pitchFamily="18" charset="0"/>
+                            </a:rPr>
+                          </m:ctrlPr>
+                        </m:sSubPr>
+                        <m:e>
+                          <m:r>
+                            <a:rPr lang="en-GB" sz="2200" b="0" i="1" smtClean="0">
+                              <a:latin typeface="Cambria Math" panose="02040503050406030204" pitchFamily="18" charset="0"/>
+                            </a:rPr>
+                            <m:t>𝑤</m:t>
+                          </m:r>
+                        </m:e>
+                        <m:sub>
+                          <m:r>
+                            <a:rPr lang="en-GB" sz="2200" b="0" i="1" smtClean="0">
+                              <a:latin typeface="Cambria Math" panose="02040503050406030204" pitchFamily="18" charset="0"/>
+                            </a:rPr>
+                            <m:t>3</m:t>
+                          </m:r>
+                        </m:sub>
+                      </m:sSub>
+                      <m:sSub>
+                        <m:sSubPr>
+                          <m:ctrlPr>
+                            <a:rPr lang="en-GB" sz="2200" b="0" i="1" smtClean="0">
+                              <a:latin typeface="Cambria Math" panose="02040503050406030204" pitchFamily="18" charset="0"/>
+                            </a:rPr>
+                          </m:ctrlPr>
+                        </m:sSubPr>
+                        <m:e>
+                          <m:r>
+                            <a:rPr lang="en-GB" sz="2200" b="0" i="1" smtClean="0">
+                              <a:latin typeface="Cambria Math" panose="02040503050406030204" pitchFamily="18" charset="0"/>
+                            </a:rPr>
+                            <m:t>𝑥</m:t>
+                          </m:r>
+                        </m:e>
+                        <m:sub>
+                          <m:r>
+                            <a:rPr lang="en-GB" sz="2200" b="0" i="1" smtClean="0">
+                              <a:latin typeface="Cambria Math" panose="02040503050406030204" pitchFamily="18" charset="0"/>
+                            </a:rPr>
+                            <m:t>3</m:t>
+                          </m:r>
+                        </m:sub>
+                      </m:sSub>
+                      <m:r>
+                        <a:rPr lang="en-GB" sz="2200" b="0" i="1" smtClean="0">
+                          <a:latin typeface="Cambria Math" panose="02040503050406030204" pitchFamily="18" charset="0"/>
+                        </a:rPr>
+                        <m:t>+</m:t>
+                      </m:r>
+                      <m:r>
+                        <a:rPr lang="en-GB" sz="2200" b="0" i="1" smtClean="0">
+                          <a:latin typeface="Cambria Math" panose="02040503050406030204" pitchFamily="18" charset="0"/>
+                        </a:rPr>
+                        <m:t>𝑏</m:t>
+                      </m:r>
+                    </m:oMath>
+                  </m:oMathPara>
+                </a14:m>
+                <a:endParaRPr lang="en-DE" sz="2200" dirty="0"/>
+              </a:p>
+            </p:txBody>
+          </p:sp>
+        </mc:Choice>
+        <mc:Fallback>
+          <p:sp>
+            <p:nvSpPr>
+              <p:cNvPr id="6" name="TextBox 5">
+                <a:extLst>
+                  <a:ext uri="{FF2B5EF4-FFF2-40B4-BE49-F238E27FC236}">
+                    <a16:creationId xmlns:a16="http://schemas.microsoft.com/office/drawing/2014/main" id="{7E0C18B7-DAE0-4845-A669-40709E44FD0C}"/>
+                  </a:ext>
+                </a:extLst>
+              </p:cNvPr>
+              <p:cNvSpPr txBox="1">
+                <a:spLocks noRot="1" noChangeAspect="1" noMove="1" noResize="1" noEditPoints="1" noAdjustHandles="1" noChangeArrowheads="1" noChangeShapeType="1" noTextEdit="1"/>
+              </p:cNvSpPr>
+              <p:nvPr/>
+            </p:nvSpPr>
+            <p:spPr>
+              <a:xfrm>
+                <a:off x="5205832" y="4198605"/>
+                <a:ext cx="3755323" cy="338554"/>
+              </a:xfrm>
+              <a:prstGeom prst="rect">
+                <a:avLst/>
+              </a:prstGeom>
+              <a:blipFill>
+                <a:blip r:embed="rId10"/>
+                <a:stretch>
+                  <a:fillRect l="-649" r="-1136" b="-16364"/>
+                </a:stretch>
+              </a:blipFill>
+            </p:spPr>
+            <p:txBody>
+              <a:bodyPr/>
+              <a:lstStyle/>
+              <a:p>
+                <a:r>
+                  <a:rPr lang="en-DE">
+                    <a:noFill/>
+                  </a:rPr>
+                  <a:t> </a:t>
+                </a:r>
+              </a:p>
+            </p:txBody>
+          </p:sp>
+        </mc:Fallback>
+      </mc:AlternateContent>
     </p:spTree>
     <p:extLst>
       <p:ext uri="{BB962C8B-B14F-4D97-AF65-F5344CB8AC3E}">

</xml_diff>